<commit_message>
AddProject pass class to function added links to gh
</commit_message>
<xml_diff>
--- a/docs/Portfolio-Florent_GALLOU.pptx
+++ b/docs/Portfolio-Florent_GALLOU.pptx
@@ -273,7 +273,7 @@
           <a:p>
             <a:fld id="{01F0DA88-5013-4C88-8953-A70AAABDFB47}" type="datetimeFigureOut">
               <a:rPr lang="fr-FR" smtClean="0"/>
-              <a:t>09/05/2021</a:t>
+              <a:t>11/05/2021</a:t>
             </a:fld>
             <a:endParaRPr lang="fr-FR"/>
           </a:p>
@@ -471,7 +471,7 @@
           <a:p>
             <a:fld id="{01F0DA88-5013-4C88-8953-A70AAABDFB47}" type="datetimeFigureOut">
               <a:rPr lang="fr-FR" smtClean="0"/>
-              <a:t>09/05/2021</a:t>
+              <a:t>11/05/2021</a:t>
             </a:fld>
             <a:endParaRPr lang="fr-FR"/>
           </a:p>
@@ -679,7 +679,7 @@
           <a:p>
             <a:fld id="{01F0DA88-5013-4C88-8953-A70AAABDFB47}" type="datetimeFigureOut">
               <a:rPr lang="fr-FR" smtClean="0"/>
-              <a:t>09/05/2021</a:t>
+              <a:t>11/05/2021</a:t>
             </a:fld>
             <a:endParaRPr lang="fr-FR"/>
           </a:p>
@@ -877,7 +877,7 @@
           <a:p>
             <a:fld id="{01F0DA88-5013-4C88-8953-A70AAABDFB47}" type="datetimeFigureOut">
               <a:rPr lang="fr-FR" smtClean="0"/>
-              <a:t>09/05/2021</a:t>
+              <a:t>11/05/2021</a:t>
             </a:fld>
             <a:endParaRPr lang="fr-FR"/>
           </a:p>
@@ -1152,7 +1152,7 @@
           <a:p>
             <a:fld id="{01F0DA88-5013-4C88-8953-A70AAABDFB47}" type="datetimeFigureOut">
               <a:rPr lang="fr-FR" smtClean="0"/>
-              <a:t>09/05/2021</a:t>
+              <a:t>11/05/2021</a:t>
             </a:fld>
             <a:endParaRPr lang="fr-FR"/>
           </a:p>
@@ -1417,7 +1417,7 @@
           <a:p>
             <a:fld id="{01F0DA88-5013-4C88-8953-A70AAABDFB47}" type="datetimeFigureOut">
               <a:rPr lang="fr-FR" smtClean="0"/>
-              <a:t>09/05/2021</a:t>
+              <a:t>11/05/2021</a:t>
             </a:fld>
             <a:endParaRPr lang="fr-FR"/>
           </a:p>
@@ -1829,7 +1829,7 @@
           <a:p>
             <a:fld id="{01F0DA88-5013-4C88-8953-A70AAABDFB47}" type="datetimeFigureOut">
               <a:rPr lang="fr-FR" smtClean="0"/>
-              <a:t>09/05/2021</a:t>
+              <a:t>11/05/2021</a:t>
             </a:fld>
             <a:endParaRPr lang="fr-FR"/>
           </a:p>
@@ -1970,7 +1970,7 @@
           <a:p>
             <a:fld id="{01F0DA88-5013-4C88-8953-A70AAABDFB47}" type="datetimeFigureOut">
               <a:rPr lang="fr-FR" smtClean="0"/>
-              <a:t>09/05/2021</a:t>
+              <a:t>11/05/2021</a:t>
             </a:fld>
             <a:endParaRPr lang="fr-FR"/>
           </a:p>
@@ -2083,7 +2083,7 @@
           <a:p>
             <a:fld id="{01F0DA88-5013-4C88-8953-A70AAABDFB47}" type="datetimeFigureOut">
               <a:rPr lang="fr-FR" smtClean="0"/>
-              <a:t>09/05/2021</a:t>
+              <a:t>11/05/2021</a:t>
             </a:fld>
             <a:endParaRPr lang="fr-FR"/>
           </a:p>
@@ -2394,7 +2394,7 @@
           <a:p>
             <a:fld id="{01F0DA88-5013-4C88-8953-A70AAABDFB47}" type="datetimeFigureOut">
               <a:rPr lang="fr-FR" smtClean="0"/>
-              <a:t>09/05/2021</a:t>
+              <a:t>11/05/2021</a:t>
             </a:fld>
             <a:endParaRPr lang="fr-FR"/>
           </a:p>
@@ -2682,7 +2682,7 @@
           <a:p>
             <a:fld id="{01F0DA88-5013-4C88-8953-A70AAABDFB47}" type="datetimeFigureOut">
               <a:rPr lang="fr-FR" smtClean="0"/>
-              <a:t>09/05/2021</a:t>
+              <a:t>11/05/2021</a:t>
             </a:fld>
             <a:endParaRPr lang="fr-FR"/>
           </a:p>
@@ -2923,7 +2923,7 @@
           <a:p>
             <a:fld id="{01F0DA88-5013-4C88-8953-A70AAABDFB47}" type="datetimeFigureOut">
               <a:rPr lang="fr-FR" smtClean="0"/>
-              <a:t>09/05/2021</a:t>
+              <a:t>11/05/2021</a:t>
             </a:fld>
             <a:endParaRPr lang="fr-FR"/>
           </a:p>
@@ -3496,8 +3496,13 @@
             </a:pPr>
             <a:r>
               <a:rPr lang="fr-FR" dirty="0"/>
-              <a:t>2- Wireframes</a:t>
-            </a:r>
+              <a:t>2- </a:t>
+            </a:r>
+            <a:r>
+              <a:rPr lang="fr-FR" dirty="0" err="1"/>
+              <a:t>KanBan</a:t>
+            </a:r>
+            <a:endParaRPr lang="fr-FR" dirty="0"/>
           </a:p>
           <a:p>
             <a:pPr marL="0" indent="0">
@@ -3505,7 +3510,16 @@
             </a:pPr>
             <a:r>
               <a:rPr lang="fr-FR" dirty="0"/>
-              <a:t>3- </a:t>
+              <a:t>3- Wireframes</a:t>
+            </a:r>
+          </a:p>
+          <a:p>
+            <a:pPr marL="0" indent="0">
+              <a:buNone/>
+            </a:pPr>
+            <a:r>
+              <a:rPr lang="fr-FR" dirty="0"/>
+              <a:t>4- </a:t>
             </a:r>
             <a:r>
               <a:rPr lang="fr-FR" dirty="0" err="1"/>
@@ -3652,7 +3666,38 @@
             </a:pPr>
             <a:r>
               <a:rPr lang="fr-FR" dirty="0"/>
-              <a:t>2- Bootstrap</a:t>
+              <a:t>2- Google Fonts</a:t>
+            </a:r>
+          </a:p>
+          <a:p>
+            <a:pPr marL="0" indent="0">
+              <a:buNone/>
+            </a:pPr>
+            <a:r>
+              <a:rPr lang="fr-FR" dirty="0"/>
+              <a:t>3- </a:t>
+            </a:r>
+            <a:r>
+              <a:rPr lang="fr-FR" dirty="0" err="1"/>
+              <a:t>FontAwesome</a:t>
+            </a:r>
+            <a:endParaRPr lang="fr-FR" dirty="0"/>
+          </a:p>
+          <a:p>
+            <a:pPr marL="0" indent="0">
+              <a:buNone/>
+            </a:pPr>
+            <a:r>
+              <a:rPr lang="fr-FR" dirty="0"/>
+              <a:t>4</a:t>
+            </a:r>
+            <a:r>
+              <a:rPr lang="fr-FR"/>
+              <a:t>- </a:t>
+            </a:r>
+            <a:r>
+              <a:rPr lang="fr-FR" dirty="0"/>
+              <a:t>Bootstrap</a:t>
             </a:r>
           </a:p>
           <a:p>
@@ -3677,29 +3722,6 @@
               <a:rPr lang="fr-FR" dirty="0"/>
               <a:t>	- class</a:t>
             </a:r>
-          </a:p>
-          <a:p>
-            <a:pPr marL="0" indent="0">
-              <a:buNone/>
-            </a:pPr>
-            <a:r>
-              <a:rPr lang="fr-FR" dirty="0"/>
-              <a:t>3- Google Fonts</a:t>
-            </a:r>
-          </a:p>
-          <a:p>
-            <a:pPr marL="0" indent="0">
-              <a:buNone/>
-            </a:pPr>
-            <a:r>
-              <a:rPr lang="fr-FR" dirty="0"/>
-              <a:t>4- </a:t>
-            </a:r>
-            <a:r>
-              <a:rPr lang="fr-FR" dirty="0" err="1"/>
-              <a:t>FontAwesome</a:t>
-            </a:r>
-            <a:endParaRPr lang="fr-FR" dirty="0"/>
           </a:p>
         </p:txBody>
       </p:sp>

</xml_diff>